<commit_message>
Fixed link at end of PPTX
</commit_message>
<xml_diff>
--- a/Organizer/Digits-Recognizer.pptx
+++ b/Organizer/Digits-Recognizer.pptx
@@ -258,7 +258,7 @@
           <a:p>
             <a:fld id="{6D2F5710-B8C1-45E8-BC94-2C035AAFE0CD}" type="datetimeFigureOut">
               <a:rPr lang="en-US" smtClean="0"/>
-              <a:t>1/5/2014</a:t>
+              <a:t>1/13/2014</a:t>
             </a:fld>
             <a:endParaRPr lang="en-US"/>
           </a:p>
@@ -474,7 +474,7 @@
           <a:p>
             <a:fld id="{6D2F5710-B8C1-45E8-BC94-2C035AAFE0CD}" type="datetimeFigureOut">
               <a:rPr lang="en-US" smtClean="0"/>
-              <a:t>1/5/2014</a:t>
+              <a:t>1/13/2014</a:t>
             </a:fld>
             <a:endParaRPr lang="en-US"/>
           </a:p>
@@ -654,7 +654,7 @@
           <a:p>
             <a:fld id="{6D2F5710-B8C1-45E8-BC94-2C035AAFE0CD}" type="datetimeFigureOut">
               <a:rPr lang="en-US" smtClean="0"/>
-              <a:t>1/5/2014</a:t>
+              <a:t>1/13/2014</a:t>
             </a:fld>
             <a:endParaRPr lang="en-US"/>
           </a:p>
@@ -857,7 +857,7 @@
           <a:p>
             <a:fld id="{6D2F5710-B8C1-45E8-BC94-2C035AAFE0CD}" type="datetimeFigureOut">
               <a:rPr lang="en-US" smtClean="0"/>
-              <a:t>1/5/2014</a:t>
+              <a:t>1/13/2014</a:t>
             </a:fld>
             <a:endParaRPr lang="en-US"/>
           </a:p>
@@ -1149,7 +1149,7 @@
           <a:p>
             <a:fld id="{6D2F5710-B8C1-45E8-BC94-2C035AAFE0CD}" type="datetimeFigureOut">
               <a:rPr lang="en-US" smtClean="0"/>
-              <a:t>1/5/2014</a:t>
+              <a:t>1/13/2014</a:t>
             </a:fld>
             <a:endParaRPr lang="en-US"/>
           </a:p>
@@ -1427,7 +1427,7 @@
           <a:p>
             <a:fld id="{6D2F5710-B8C1-45E8-BC94-2C035AAFE0CD}" type="datetimeFigureOut">
               <a:rPr lang="en-US" smtClean="0"/>
-              <a:t>1/5/2014</a:t>
+              <a:t>1/13/2014</a:t>
             </a:fld>
             <a:endParaRPr lang="en-US"/>
           </a:p>
@@ -1840,7 +1840,7 @@
           <a:p>
             <a:fld id="{6D2F5710-B8C1-45E8-BC94-2C035AAFE0CD}" type="datetimeFigureOut">
               <a:rPr lang="en-US" smtClean="0"/>
-              <a:t>1/5/2014</a:t>
+              <a:t>1/13/2014</a:t>
             </a:fld>
             <a:endParaRPr lang="en-US"/>
           </a:p>
@@ -2004,7 +2004,7 @@
           <a:p>
             <a:fld id="{6D2F5710-B8C1-45E8-BC94-2C035AAFE0CD}" type="datetimeFigureOut">
               <a:rPr lang="en-US" smtClean="0"/>
-              <a:t>1/5/2014</a:t>
+              <a:t>1/13/2014</a:t>
             </a:fld>
             <a:endParaRPr lang="en-US"/>
           </a:p>
@@ -2145,7 +2145,7 @@
           <a:p>
             <a:fld id="{6D2F5710-B8C1-45E8-BC94-2C035AAFE0CD}" type="datetimeFigureOut">
               <a:rPr lang="en-US" smtClean="0"/>
-              <a:t>1/5/2014</a:t>
+              <a:t>1/13/2014</a:t>
             </a:fld>
             <a:endParaRPr lang="en-US"/>
           </a:p>
@@ -2422,7 +2422,7 @@
           <a:p>
             <a:fld id="{6D2F5710-B8C1-45E8-BC94-2C035AAFE0CD}" type="datetimeFigureOut">
               <a:rPr lang="en-US" smtClean="0"/>
-              <a:t>1/5/2014</a:t>
+              <a:t>1/13/2014</a:t>
             </a:fld>
             <a:endParaRPr lang="en-US"/>
           </a:p>
@@ -2675,7 +2675,7 @@
           <a:p>
             <a:fld id="{6D2F5710-B8C1-45E8-BC94-2C035AAFE0CD}" type="datetimeFigureOut">
               <a:rPr lang="en-US" smtClean="0"/>
-              <a:t>1/5/2014</a:t>
+              <a:t>1/13/2014</a:t>
             </a:fld>
             <a:endParaRPr lang="en-US"/>
           </a:p>
@@ -2891,7 +2891,7 @@
             <a:fld id="{6D2F5710-B8C1-45E8-BC94-2C035AAFE0CD}" type="datetimeFigureOut">
               <a:rPr lang="en-US" smtClean="0"/>
               <a:pPr/>
-              <a:t>1/5/2014</a:t>
+              <a:t>1/13/2014</a:t>
             </a:fld>
             <a:endParaRPr lang="en-US"/>
           </a:p>
@@ -15163,12 +15163,11 @@
               <a:rPr lang="en-US" dirty="0" smtClean="0"/>
               <a:t>Guided script available at:</a:t>
             </a:r>
-            <a:endParaRPr lang="en-US" dirty="0" smtClean="0"/>
           </a:p>
           <a:p>
             <a:r>
-              <a:rPr lang="en-US" b="1" dirty="0"/>
-              <a:t>www.github.com/c4fsharp/dojo-ham-or-spam</a:t>
+              <a:rPr lang="en-US" b="1" dirty="0" smtClean="0"/>
+              <a:t>www.github.com/c4fsharp/Dojo-Digits-Recognizer</a:t>
             </a:r>
             <a:endParaRPr lang="en-US" dirty="0"/>
           </a:p>
@@ -15462,11 +15461,7 @@
           <a:p>
             <a:r>
               <a:rPr lang="en-US" dirty="0" smtClean="0"/>
-              <a:t>Dataset </a:t>
-            </a:r>
-            <a:r>
-              <a:rPr lang="en-US" dirty="0" smtClean="0"/>
-              <a:t>of hand-written digits</a:t>
+              <a:t>Dataset of hand-written digits</a:t>
             </a:r>
           </a:p>
           <a:p>
@@ -15703,11 +15698,7 @@
           <a:p>
             <a:r>
               <a:rPr lang="en-US" dirty="0" smtClean="0"/>
-              <a:t>CSV </a:t>
-            </a:r>
-            <a:r>
-              <a:rPr lang="en-US" dirty="0" smtClean="0"/>
-              <a:t>file</a:t>
+              <a:t>CSV file</a:t>
             </a:r>
           </a:p>
           <a:p>

</xml_diff>